<commit_message>
add the features that could predict next few question
</commit_message>
<xml_diff>
--- a/Presentation.pptx
+++ b/Presentation.pptx
@@ -5,7 +5,10 @@
     <p:sldMasterId id="2147483648" r:id="rId1"/>
   </p:sldMasterIdLst>
   <p:sldIdLst>
-    <p:sldId id="256" r:id="rId2"/>
+    <p:sldId id="268" r:id="rId2"/>
+    <p:sldId id="257" r:id="rId3"/>
+    <p:sldId id="262" r:id="rId4"/>
+    <p:sldId id="263" r:id="rId5"/>
   </p:sldIdLst>
   <p:sldSz cx="12192000" cy="6858000"/>
   <p:notesSz cx="6858000" cy="9144000"/>
@@ -259,7 +262,7 @@
           <a:p>
             <a:fld id="{B67E8722-7D95-D948-ADEB-EC72AF564164}" type="datetimeFigureOut">
               <a:rPr lang="en-US" smtClean="0"/>
-              <a:t>4/6/24</a:t>
+              <a:t>4/16/24</a:t>
             </a:fld>
             <a:endParaRPr lang="en-US"/>
           </a:p>
@@ -457,7 +460,7 @@
           <a:p>
             <a:fld id="{B67E8722-7D95-D948-ADEB-EC72AF564164}" type="datetimeFigureOut">
               <a:rPr lang="en-US" smtClean="0"/>
-              <a:t>4/6/24</a:t>
+              <a:t>4/16/24</a:t>
             </a:fld>
             <a:endParaRPr lang="en-US"/>
           </a:p>
@@ -665,7 +668,7 @@
           <a:p>
             <a:fld id="{B67E8722-7D95-D948-ADEB-EC72AF564164}" type="datetimeFigureOut">
               <a:rPr lang="en-US" smtClean="0"/>
-              <a:t>4/6/24</a:t>
+              <a:t>4/16/24</a:t>
             </a:fld>
             <a:endParaRPr lang="en-US"/>
           </a:p>
@@ -863,7 +866,7 @@
           <a:p>
             <a:fld id="{B67E8722-7D95-D948-ADEB-EC72AF564164}" type="datetimeFigureOut">
               <a:rPr lang="en-US" smtClean="0"/>
-              <a:t>4/6/24</a:t>
+              <a:t>4/16/24</a:t>
             </a:fld>
             <a:endParaRPr lang="en-US"/>
           </a:p>
@@ -1138,7 +1141,7 @@
           <a:p>
             <a:fld id="{B67E8722-7D95-D948-ADEB-EC72AF564164}" type="datetimeFigureOut">
               <a:rPr lang="en-US" smtClean="0"/>
-              <a:t>4/6/24</a:t>
+              <a:t>4/16/24</a:t>
             </a:fld>
             <a:endParaRPr lang="en-US"/>
           </a:p>
@@ -1403,7 +1406,7 @@
           <a:p>
             <a:fld id="{B67E8722-7D95-D948-ADEB-EC72AF564164}" type="datetimeFigureOut">
               <a:rPr lang="en-US" smtClean="0"/>
-              <a:t>4/6/24</a:t>
+              <a:t>4/16/24</a:t>
             </a:fld>
             <a:endParaRPr lang="en-US"/>
           </a:p>
@@ -1815,7 +1818,7 @@
           <a:p>
             <a:fld id="{B67E8722-7D95-D948-ADEB-EC72AF564164}" type="datetimeFigureOut">
               <a:rPr lang="en-US" smtClean="0"/>
-              <a:t>4/6/24</a:t>
+              <a:t>4/16/24</a:t>
             </a:fld>
             <a:endParaRPr lang="en-US"/>
           </a:p>
@@ -1956,7 +1959,7 @@
           <a:p>
             <a:fld id="{B67E8722-7D95-D948-ADEB-EC72AF564164}" type="datetimeFigureOut">
               <a:rPr lang="en-US" smtClean="0"/>
-              <a:t>4/6/24</a:t>
+              <a:t>4/16/24</a:t>
             </a:fld>
             <a:endParaRPr lang="en-US"/>
           </a:p>
@@ -2069,7 +2072,7 @@
           <a:p>
             <a:fld id="{B67E8722-7D95-D948-ADEB-EC72AF564164}" type="datetimeFigureOut">
               <a:rPr lang="en-US" smtClean="0"/>
-              <a:t>4/6/24</a:t>
+              <a:t>4/16/24</a:t>
             </a:fld>
             <a:endParaRPr lang="en-US"/>
           </a:p>
@@ -2380,7 +2383,7 @@
           <a:p>
             <a:fld id="{B67E8722-7D95-D948-ADEB-EC72AF564164}" type="datetimeFigureOut">
               <a:rPr lang="en-US" smtClean="0"/>
-              <a:t>4/6/24</a:t>
+              <a:t>4/16/24</a:t>
             </a:fld>
             <a:endParaRPr lang="en-US"/>
           </a:p>
@@ -2668,7 +2671,7 @@
           <a:p>
             <a:fld id="{B67E8722-7D95-D948-ADEB-EC72AF564164}" type="datetimeFigureOut">
               <a:rPr lang="en-US" smtClean="0"/>
-              <a:t>4/6/24</a:t>
+              <a:t>4/16/24</a:t>
             </a:fld>
             <a:endParaRPr lang="en-US"/>
           </a:p>
@@ -2909,7 +2912,7 @@
           <a:p>
             <a:fld id="{B67E8722-7D95-D948-ADEB-EC72AF564164}" type="datetimeFigureOut">
               <a:rPr lang="en-US" smtClean="0"/>
-              <a:t>4/6/24</a:t>
+              <a:t>4/16/24</a:t>
             </a:fld>
             <a:endParaRPr lang="en-US"/>
           </a:p>
@@ -3328,6 +3331,305 @@
       </p:grpSpPr>
       <p:sp>
         <p:nvSpPr>
+          <p:cNvPr id="5" name="TextBox 4">
+            <a:extLst>
+              <a:ext uri="{FF2B5EF4-FFF2-40B4-BE49-F238E27FC236}">
+                <a16:creationId xmlns:a16="http://schemas.microsoft.com/office/drawing/2014/main" id="{642672D9-B1D0-9B5B-D923-EB7C4494054E}"/>
+              </a:ext>
+            </a:extLst>
+          </p:cNvPr>
+          <p:cNvSpPr txBox="1"/>
+          <p:nvPr/>
+        </p:nvSpPr>
+        <p:spPr>
+          <a:xfrm>
+            <a:off x="525516" y="957445"/>
+            <a:ext cx="11119945" cy="5139869"/>
+          </a:xfrm>
+          <a:prstGeom prst="rect">
+            <a:avLst/>
+          </a:prstGeom>
+          <a:noFill/>
+        </p:spPr>
+        <p:txBody>
+          <a:bodyPr wrap="square">
+            <a:spAutoFit/>
+          </a:bodyPr>
+          <a:lstStyle/>
+          <a:p>
+            <a:pPr marL="0" indent="0">
+              <a:buNone/>
+            </a:pPr>
+            <a:r>
+              <a:rPr lang="en-US" sz="2000" dirty="0">
+                <a:latin typeface="Times New Roman" panose="02020603050405020304" pitchFamily="18" charset="0"/>
+                <a:cs typeface="Times New Roman" panose="02020603050405020304" pitchFamily="18" charset="0"/>
+              </a:rPr>
+              <a:t>Workflow:</a:t>
+            </a:r>
+          </a:p>
+          <a:p>
+            <a:pPr marL="342900" indent="-342900">
+              <a:buAutoNum type="arabicPeriod"/>
+            </a:pPr>
+            <a:r>
+              <a:rPr lang="en-US" sz="2000" dirty="0">
+                <a:latin typeface="Times New Roman" panose="02020603050405020304" pitchFamily="18" charset="0"/>
+                <a:cs typeface="Times New Roman" panose="02020603050405020304" pitchFamily="18" charset="0"/>
+              </a:rPr>
+              <a:t>Collect lots of different kinds of professional books, categorize these books based on these functions, and split these text into equal sized text.</a:t>
+            </a:r>
+          </a:p>
+          <a:p>
+            <a:pPr marL="342900" indent="-342900">
+              <a:buAutoNum type="arabicPeriod"/>
+            </a:pPr>
+            <a:r>
+              <a:rPr lang="en-US" sz="2000" dirty="0">
+                <a:latin typeface="Times New Roman" panose="02020603050405020304" pitchFamily="18" charset="0"/>
+                <a:cs typeface="Times New Roman" panose="02020603050405020304" pitchFamily="18" charset="0"/>
+              </a:rPr>
+              <a:t>Train a text classification model</a:t>
+            </a:r>
+          </a:p>
+          <a:p>
+            <a:pPr marL="800100" lvl="1" indent="-342900">
+              <a:buAutoNum type="arabicPeriod"/>
+            </a:pPr>
+            <a:r>
+              <a:rPr lang="en-US" sz="2000" dirty="0">
+                <a:latin typeface="Times New Roman" panose="02020603050405020304" pitchFamily="18" charset="0"/>
+                <a:cs typeface="Times New Roman" panose="02020603050405020304" pitchFamily="18" charset="0"/>
+              </a:rPr>
+              <a:t>Use embedding model (like BGE, all-</a:t>
+            </a:r>
+            <a:r>
+              <a:rPr lang="en-US" sz="2000" dirty="0" err="1">
+                <a:latin typeface="Times New Roman" panose="02020603050405020304" pitchFamily="18" charset="0"/>
+                <a:cs typeface="Times New Roman" panose="02020603050405020304" pitchFamily="18" charset="0"/>
+              </a:rPr>
+              <a:t>MiniLM</a:t>
+            </a:r>
+            <a:r>
+              <a:rPr lang="en-US" sz="2000" dirty="0">
+                <a:latin typeface="Times New Roman" panose="02020603050405020304" pitchFamily="18" charset="0"/>
+                <a:cs typeface="Times New Roman" panose="02020603050405020304" pitchFamily="18" charset="0"/>
+              </a:rPr>
+              <a:t>) to generate the embedding of these split text and save them into DB by utilizing LSH / HNSW/ IVFPQ index to accelerate the process of searching. </a:t>
+            </a:r>
+          </a:p>
+          <a:p>
+            <a:pPr marL="800100" lvl="1" indent="-342900">
+              <a:buAutoNum type="arabicPeriod"/>
+            </a:pPr>
+            <a:r>
+              <a:rPr lang="en-US" sz="2000" dirty="0">
+                <a:latin typeface="Times New Roman" panose="02020603050405020304" pitchFamily="18" charset="0"/>
+                <a:cs typeface="Times New Roman" panose="02020603050405020304" pitchFamily="18" charset="0"/>
+              </a:rPr>
+              <a:t>Collect lots of queries, apply them by using embedding model to get the embeddings, and find the category of nearest K texts in the DB.</a:t>
+            </a:r>
+          </a:p>
+          <a:p>
+            <a:pPr marL="800100" lvl="1" indent="-342900">
+              <a:buAutoNum type="arabicPeriod"/>
+            </a:pPr>
+            <a:r>
+              <a:rPr lang="en-US" sz="2000" dirty="0">
+                <a:latin typeface="Times New Roman" panose="02020603050405020304" pitchFamily="18" charset="0"/>
+                <a:cs typeface="Times New Roman" panose="02020603050405020304" pitchFamily="18" charset="0"/>
+              </a:rPr>
+              <a:t>Choose the most voted category as the query’s category (label), so we get the query-label data pair.</a:t>
+            </a:r>
+          </a:p>
+          <a:p>
+            <a:pPr marL="800100" lvl="1" indent="-342900">
+              <a:buAutoNum type="arabicPeriod"/>
+            </a:pPr>
+            <a:r>
+              <a:rPr lang="en-US" sz="2000" dirty="0">
+                <a:latin typeface="Times New Roman" panose="02020603050405020304" pitchFamily="18" charset="0"/>
+                <a:cs typeface="Times New Roman" panose="02020603050405020304" pitchFamily="18" charset="0"/>
+              </a:rPr>
+              <a:t>Train a text classification light model that predicts which category this query belongs to. </a:t>
+            </a:r>
+          </a:p>
+          <a:p>
+            <a:pPr marL="342900" indent="-342900">
+              <a:buAutoNum type="arabicPeriod"/>
+            </a:pPr>
+            <a:r>
+              <a:rPr lang="en-US" sz="2800" dirty="0">
+                <a:latin typeface="Times New Roman" panose="02020603050405020304" pitchFamily="18" charset="0"/>
+                <a:cs typeface="Times New Roman" panose="02020603050405020304" pitchFamily="18" charset="0"/>
+              </a:rPr>
+              <a:t>Infer the answer</a:t>
+            </a:r>
+          </a:p>
+          <a:p>
+            <a:pPr marL="800100" lvl="1" indent="-342900">
+              <a:buAutoNum type="arabicPeriod"/>
+            </a:pPr>
+            <a:r>
+              <a:rPr lang="en-US" sz="2000" dirty="0">
+                <a:latin typeface="Times New Roman" panose="02020603050405020304" pitchFamily="18" charset="0"/>
+                <a:cs typeface="Times New Roman" panose="02020603050405020304" pitchFamily="18" charset="0"/>
+              </a:rPr>
+              <a:t>When user ask some questions, use the model from step 2 to generate the category, then find the most likely/similar M texts in the predicted domain DB.</a:t>
+            </a:r>
+          </a:p>
+          <a:p>
+            <a:pPr marL="800100" lvl="1" indent="-342900">
+              <a:buAutoNum type="arabicPeriod"/>
+            </a:pPr>
+            <a:r>
+              <a:rPr lang="en-US" sz="2000" dirty="0">
+                <a:latin typeface="Times New Roman" panose="02020603050405020304" pitchFamily="18" charset="0"/>
+                <a:cs typeface="Times New Roman" panose="02020603050405020304" pitchFamily="18" charset="0"/>
+              </a:rPr>
+              <a:t>Generate the prompt by using these M text chunks.</a:t>
+            </a:r>
+          </a:p>
+          <a:p>
+            <a:pPr marL="800100" lvl="1" indent="-342900">
+              <a:buAutoNum type="arabicPeriod"/>
+            </a:pPr>
+            <a:r>
+              <a:rPr lang="en-US" sz="2000" dirty="0">
+                <a:latin typeface="Times New Roman" panose="02020603050405020304" pitchFamily="18" charset="0"/>
+                <a:cs typeface="Times New Roman" panose="02020603050405020304" pitchFamily="18" charset="0"/>
+              </a:rPr>
+              <a:t>Feed the prompt to generate the answer.</a:t>
+            </a:r>
+          </a:p>
+          <a:p>
+            <a:pPr marL="800100" lvl="1" indent="-342900">
+              <a:buAutoNum type="arabicPeriod"/>
+            </a:pPr>
+            <a:r>
+              <a:rPr lang="en-US" sz="2000" dirty="0">
+                <a:latin typeface="Times New Roman" panose="02020603050405020304" pitchFamily="18" charset="0"/>
+                <a:cs typeface="Times New Roman" panose="02020603050405020304" pitchFamily="18" charset="0"/>
+              </a:rPr>
+              <a:t>The chatbot can also output relevant data sources, such as which page of which book.</a:t>
+            </a:r>
+          </a:p>
+        </p:txBody>
+      </p:sp>
+      <p:sp>
+        <p:nvSpPr>
+          <p:cNvPr id="6" name="Title 1">
+            <a:extLst>
+              <a:ext uri="{FF2B5EF4-FFF2-40B4-BE49-F238E27FC236}">
+                <a16:creationId xmlns:a16="http://schemas.microsoft.com/office/drawing/2014/main" id="{C5431886-9A6D-2FFB-1ACE-A97AE5F84D8C}"/>
+              </a:ext>
+            </a:extLst>
+          </p:cNvPr>
+          <p:cNvSpPr txBox="1">
+            <a:spLocks/>
+          </p:cNvSpPr>
+          <p:nvPr/>
+        </p:nvSpPr>
+        <p:spPr>
+          <a:xfrm>
+            <a:off x="743607" y="175911"/>
+            <a:ext cx="10515600" cy="662782"/>
+          </a:xfrm>
+          <a:prstGeom prst="rect">
+            <a:avLst/>
+          </a:prstGeom>
+        </p:spPr>
+        <p:txBody>
+          <a:bodyPr vert="horz" lIns="91440" tIns="45720" rIns="91440" bIns="45720" rtlCol="0" anchor="ctr">
+            <a:normAutofit/>
+          </a:bodyPr>
+          <a:lstStyle>
+            <a:lvl1pPr algn="l" defTabSz="914400" rtl="0" eaLnBrk="1" latinLnBrk="0" hangingPunct="1">
+              <a:lnSpc>
+                <a:spcPct val="90000"/>
+              </a:lnSpc>
+              <a:spcBef>
+                <a:spcPct val="0"/>
+              </a:spcBef>
+              <a:buNone/>
+              <a:defRPr sz="4400" kern="1200">
+                <a:solidFill>
+                  <a:schemeClr val="tx1"/>
+                </a:solidFill>
+                <a:latin typeface="+mj-lt"/>
+                <a:ea typeface="+mj-ea"/>
+                <a:cs typeface="+mj-cs"/>
+              </a:defRPr>
+            </a:lvl1pPr>
+          </a:lstStyle>
+          <a:p>
+            <a:r>
+              <a:rPr lang="en-US" sz="3200">
+                <a:latin typeface="Times New Roman" panose="02020603050405020304" pitchFamily="18" charset="0"/>
+                <a:cs typeface="Times New Roman" panose="02020603050405020304" pitchFamily="18" charset="0"/>
+              </a:rPr>
+              <a:t>Recent Project –</a:t>
+            </a:r>
+            <a:r>
+              <a:rPr lang="zh-CN" altLang="en-US" sz="3200">
+                <a:latin typeface="Times New Roman" panose="02020603050405020304" pitchFamily="18" charset="0"/>
+                <a:cs typeface="Times New Roman" panose="02020603050405020304" pitchFamily="18" charset="0"/>
+              </a:rPr>
+              <a:t> </a:t>
+            </a:r>
+            <a:r>
+              <a:rPr lang="en-US" altLang="zh-CN" sz="3200">
+                <a:latin typeface="Times New Roman" panose="02020603050405020304" pitchFamily="18" charset="0"/>
+                <a:cs typeface="Times New Roman" panose="02020603050405020304" pitchFamily="18" charset="0"/>
+              </a:rPr>
+              <a:t>1.</a:t>
+            </a:r>
+            <a:r>
+              <a:rPr lang="en-US" sz="3200">
+                <a:latin typeface="Times New Roman" panose="02020603050405020304" pitchFamily="18" charset="0"/>
+                <a:cs typeface="Times New Roman" panose="02020603050405020304" pitchFamily="18" charset="0"/>
+              </a:rPr>
+              <a:t> Adaptive domain Chatbot</a:t>
+            </a:r>
+            <a:endParaRPr lang="en-US" sz="3200" dirty="0">
+              <a:latin typeface="Times New Roman" panose="02020603050405020304" pitchFamily="18" charset="0"/>
+              <a:cs typeface="Times New Roman" panose="02020603050405020304" pitchFamily="18" charset="0"/>
+            </a:endParaRPr>
+          </a:p>
+        </p:txBody>
+      </p:sp>
+    </p:spTree>
+    <p:extLst>
+      <p:ext uri="{BB962C8B-B14F-4D97-AF65-F5344CB8AC3E}">
+        <p14:creationId xmlns:p14="http://schemas.microsoft.com/office/powerpoint/2010/main" val="1309137318"/>
+      </p:ext>
+    </p:extLst>
+  </p:cSld>
+  <p:clrMapOvr>
+    <a:masterClrMapping/>
+  </p:clrMapOvr>
+</p:sld>
+</file>
+
+<file path=ppt/slides/slide2.xml><?xml version="1.0" encoding="utf-8"?>
+<p:sld xmlns:a="http://schemas.openxmlformats.org/drawingml/2006/main" xmlns:r="http://schemas.openxmlformats.org/officeDocument/2006/relationships" xmlns:p="http://schemas.openxmlformats.org/presentationml/2006/main">
+  <p:cSld>
+    <p:spTree>
+      <p:nvGrpSpPr>
+        <p:cNvPr id="1" name=""/>
+        <p:cNvGrpSpPr/>
+        <p:nvPr/>
+      </p:nvGrpSpPr>
+      <p:grpSpPr>
+        <a:xfrm>
+          <a:off x="0" y="0"/>
+          <a:ext cx="0" cy="0"/>
+          <a:chOff x="0" y="0"/>
+          <a:chExt cx="0" cy="0"/>
+        </a:xfrm>
+      </p:grpSpPr>
+      <p:sp>
+        <p:nvSpPr>
           <p:cNvPr id="5" name="Right Arrow 4">
             <a:extLst>
               <a:ext uri="{FF2B5EF4-FFF2-40B4-BE49-F238E27FC236}">
@@ -3340,8 +3642,8 @@
         </p:nvSpPr>
         <p:spPr>
           <a:xfrm>
-            <a:off x="1472516" y="1392620"/>
-            <a:ext cx="2048805" cy="599089"/>
+            <a:off x="1264646" y="988292"/>
+            <a:ext cx="1781600" cy="599089"/>
           </a:xfrm>
           <a:prstGeom prst="rightArrow">
             <a:avLst/>
@@ -3366,7 +3668,10 @@
           <a:lstStyle/>
           <a:p>
             <a:pPr algn="ctr"/>
-            <a:endParaRPr lang="en-US" dirty="0"/>
+            <a:endParaRPr lang="en-US" sz="1600" dirty="0">
+              <a:latin typeface="Times New Roman" panose="02020603050405020304" pitchFamily="18" charset="0"/>
+              <a:cs typeface="Times New Roman" panose="02020603050405020304" pitchFamily="18" charset="0"/>
+            </a:endParaRPr>
           </a:p>
         </p:txBody>
       </p:sp>
@@ -3384,7 +3689,7 @@
         </p:nvSpPr>
         <p:spPr>
           <a:xfrm>
-            <a:off x="3859923" y="940675"/>
+            <a:off x="2971746" y="297417"/>
             <a:ext cx="252248" cy="472967"/>
           </a:xfrm>
           <a:prstGeom prst="cube">
@@ -3412,7 +3717,10 @@
           <a:lstStyle/>
           <a:p>
             <a:pPr algn="ctr"/>
-            <a:endParaRPr lang="en-US"/>
+            <a:endParaRPr lang="en-US" sz="1600">
+              <a:latin typeface="Times New Roman" panose="02020603050405020304" pitchFamily="18" charset="0"/>
+              <a:cs typeface="Times New Roman" panose="02020603050405020304" pitchFamily="18" charset="0"/>
+            </a:endParaRPr>
           </a:p>
         </p:txBody>
       </p:sp>
@@ -3430,7 +3738,7 @@
         </p:nvSpPr>
         <p:spPr>
           <a:xfrm>
-            <a:off x="4012323" y="1093075"/>
+            <a:off x="3124146" y="449817"/>
             <a:ext cx="252248" cy="472967"/>
           </a:xfrm>
           <a:prstGeom prst="cube">
@@ -3458,7 +3766,10 @@
           <a:lstStyle/>
           <a:p>
             <a:pPr algn="ctr"/>
-            <a:endParaRPr lang="en-US"/>
+            <a:endParaRPr lang="en-US" sz="1600">
+              <a:latin typeface="Times New Roman" panose="02020603050405020304" pitchFamily="18" charset="0"/>
+              <a:cs typeface="Times New Roman" panose="02020603050405020304" pitchFamily="18" charset="0"/>
+            </a:endParaRPr>
           </a:p>
         </p:txBody>
       </p:sp>
@@ -3476,7 +3787,7 @@
         </p:nvSpPr>
         <p:spPr>
           <a:xfrm>
-            <a:off x="4164723" y="1245475"/>
+            <a:off x="3276546" y="602217"/>
             <a:ext cx="252248" cy="472967"/>
           </a:xfrm>
           <a:prstGeom prst="cube">
@@ -3504,7 +3815,10 @@
           <a:lstStyle/>
           <a:p>
             <a:pPr algn="ctr"/>
-            <a:endParaRPr lang="en-US"/>
+            <a:endParaRPr lang="en-US" sz="1600">
+              <a:latin typeface="Times New Roman" panose="02020603050405020304" pitchFamily="18" charset="0"/>
+              <a:cs typeface="Times New Roman" panose="02020603050405020304" pitchFamily="18" charset="0"/>
+            </a:endParaRPr>
           </a:p>
         </p:txBody>
       </p:sp>
@@ -3522,7 +3836,7 @@
         </p:nvSpPr>
         <p:spPr>
           <a:xfrm>
-            <a:off x="4317123" y="1397875"/>
+            <a:off x="3428946" y="754617"/>
             <a:ext cx="252248" cy="472967"/>
           </a:xfrm>
           <a:prstGeom prst="cube">
@@ -3550,7 +3864,10 @@
           <a:lstStyle/>
           <a:p>
             <a:pPr algn="ctr"/>
-            <a:endParaRPr lang="en-US"/>
+            <a:endParaRPr lang="en-US" sz="1600">
+              <a:latin typeface="Times New Roman" panose="02020603050405020304" pitchFamily="18" charset="0"/>
+              <a:cs typeface="Times New Roman" panose="02020603050405020304" pitchFamily="18" charset="0"/>
+            </a:endParaRPr>
           </a:p>
         </p:txBody>
       </p:sp>
@@ -3568,7 +3885,7 @@
         </p:nvSpPr>
         <p:spPr>
           <a:xfrm>
-            <a:off x="4469523" y="1550275"/>
+            <a:off x="3581346" y="907017"/>
             <a:ext cx="252248" cy="472967"/>
           </a:xfrm>
           <a:prstGeom prst="cube">
@@ -3596,7 +3913,10 @@
           <a:lstStyle/>
           <a:p>
             <a:pPr algn="ctr"/>
-            <a:endParaRPr lang="en-US"/>
+            <a:endParaRPr lang="en-US" sz="1600">
+              <a:latin typeface="Times New Roman" panose="02020603050405020304" pitchFamily="18" charset="0"/>
+              <a:cs typeface="Times New Roman" panose="02020603050405020304" pitchFamily="18" charset="0"/>
+            </a:endParaRPr>
           </a:p>
         </p:txBody>
       </p:sp>
@@ -3614,7 +3934,7 @@
         </p:nvSpPr>
         <p:spPr>
           <a:xfrm>
-            <a:off x="4621923" y="1702675"/>
+            <a:off x="3733746" y="1059417"/>
             <a:ext cx="252248" cy="472967"/>
           </a:xfrm>
           <a:prstGeom prst="cube">
@@ -3642,7 +3962,10 @@
           <a:lstStyle/>
           <a:p>
             <a:pPr algn="ctr"/>
-            <a:endParaRPr lang="en-US"/>
+            <a:endParaRPr lang="en-US" sz="1600">
+              <a:latin typeface="Times New Roman" panose="02020603050405020304" pitchFamily="18" charset="0"/>
+              <a:cs typeface="Times New Roman" panose="02020603050405020304" pitchFamily="18" charset="0"/>
+            </a:endParaRPr>
           </a:p>
         </p:txBody>
       </p:sp>
@@ -3660,8 +3983,8 @@
         </p:nvSpPr>
         <p:spPr>
           <a:xfrm>
-            <a:off x="1472516" y="88714"/>
-            <a:ext cx="1941787" cy="1477328"/>
+            <a:off x="1155580" y="57917"/>
+            <a:ext cx="2112605" cy="1077218"/>
           </a:xfrm>
           <a:prstGeom prst="rect">
             <a:avLst/>
@@ -3675,7 +3998,10 @@
           <a:lstStyle/>
           <a:p>
             <a:r>
-              <a:rPr lang="en-US" dirty="0"/>
+              <a:rPr lang="en-US" sz="1600" dirty="0">
+                <a:latin typeface="Times New Roman" panose="02020603050405020304" pitchFamily="18" charset="0"/>
+                <a:cs typeface="Times New Roman" panose="02020603050405020304" pitchFamily="18" charset="0"/>
+              </a:rPr>
               <a:t>Categorize books by the type and divide these books into different chunks</a:t>
             </a:r>
           </a:p>
@@ -3695,8 +4021,8 @@
         </p:nvSpPr>
         <p:spPr>
           <a:xfrm>
-            <a:off x="5186853" y="253828"/>
-            <a:ext cx="2619709" cy="923330"/>
+            <a:off x="4086837" y="119196"/>
+            <a:ext cx="2231178" cy="1077218"/>
           </a:xfrm>
           <a:prstGeom prst="rect">
             <a:avLst/>
@@ -3710,7 +4036,10 @@
           <a:lstStyle/>
           <a:p>
             <a:r>
-              <a:rPr lang="en-US" dirty="0"/>
+              <a:rPr lang="en-US" sz="1600" dirty="0">
+                <a:latin typeface="Times New Roman" panose="02020603050405020304" pitchFamily="18" charset="0"/>
+                <a:cs typeface="Times New Roman" panose="02020603050405020304" pitchFamily="18" charset="0"/>
+              </a:rPr>
               <a:t>Tokenize and apply HNSW / INVPQ / LSH to index these embeddings</a:t>
             </a:r>
           </a:p>
@@ -3730,7 +4059,7 @@
         </p:nvSpPr>
         <p:spPr>
           <a:xfrm>
-            <a:off x="191242" y="1077705"/>
+            <a:off x="121666" y="710230"/>
             <a:ext cx="1094217" cy="976674"/>
           </a:xfrm>
           <a:prstGeom prst="cube">
@@ -3759,7 +4088,10 @@
           <a:p>
             <a:pPr algn="ctr"/>
             <a:r>
-              <a:rPr lang="en-US" dirty="0"/>
+              <a:rPr lang="en-US" sz="1600" dirty="0">
+                <a:latin typeface="Times New Roman" panose="02020603050405020304" pitchFamily="18" charset="0"/>
+                <a:cs typeface="Times New Roman" panose="02020603050405020304" pitchFamily="18" charset="0"/>
+              </a:rPr>
               <a:t>books</a:t>
             </a:r>
           </a:p>
@@ -3779,8 +4111,8 @@
         </p:nvSpPr>
         <p:spPr>
           <a:xfrm>
-            <a:off x="7905835" y="827378"/>
-            <a:ext cx="1082566" cy="1380531"/>
+            <a:off x="6383305" y="1037378"/>
+            <a:ext cx="1082566" cy="388947"/>
           </a:xfrm>
           <a:prstGeom prst="can">
             <a:avLst/>
@@ -3808,7 +4140,10 @@
           <a:p>
             <a:pPr algn="ctr"/>
             <a:r>
-              <a:rPr lang="en-US" dirty="0"/>
+              <a:rPr lang="en-US" sz="1600" dirty="0">
+                <a:latin typeface="Times New Roman" panose="02020603050405020304" pitchFamily="18" charset="0"/>
+                <a:cs typeface="Times New Roman" panose="02020603050405020304" pitchFamily="18" charset="0"/>
+              </a:rPr>
               <a:t>DB</a:t>
             </a:r>
           </a:p>
@@ -3828,7 +4163,7 @@
         </p:nvSpPr>
         <p:spPr>
           <a:xfrm>
-            <a:off x="5356141" y="1371599"/>
+            <a:off x="4061627" y="1007970"/>
             <a:ext cx="2281131" cy="599089"/>
           </a:xfrm>
           <a:prstGeom prst="rightArrow">
@@ -3854,7 +4189,10 @@
           <a:lstStyle/>
           <a:p>
             <a:pPr algn="ctr"/>
-            <a:endParaRPr lang="en-US" dirty="0"/>
+            <a:endParaRPr lang="en-US" sz="1600" dirty="0">
+              <a:latin typeface="Times New Roman" panose="02020603050405020304" pitchFamily="18" charset="0"/>
+              <a:cs typeface="Times New Roman" panose="02020603050405020304" pitchFamily="18" charset="0"/>
+            </a:endParaRPr>
           </a:p>
         </p:txBody>
       </p:sp>
@@ -3872,7 +4210,7 @@
         </p:nvSpPr>
         <p:spPr>
           <a:xfrm>
-            <a:off x="10301442" y="6027682"/>
+            <a:off x="7416857" y="5266462"/>
             <a:ext cx="1734207" cy="576490"/>
           </a:xfrm>
           <a:prstGeom prst="flowChartMagneticDisk">
@@ -3904,7 +4242,10 @@
           <a:p>
             <a:pPr algn="ctr"/>
             <a:r>
-              <a:rPr lang="en-US" dirty="0"/>
+              <a:rPr lang="en-US" sz="1600" dirty="0">
+                <a:latin typeface="Times New Roman" panose="02020603050405020304" pitchFamily="18" charset="0"/>
+                <a:cs typeface="Times New Roman" panose="02020603050405020304" pitchFamily="18" charset="0"/>
+              </a:rPr>
               <a:t>BERT</a:t>
             </a:r>
           </a:p>
@@ -3924,7 +4265,7 @@
         </p:nvSpPr>
         <p:spPr>
           <a:xfrm>
-            <a:off x="7325141" y="5860206"/>
+            <a:off x="5414441" y="5105892"/>
             <a:ext cx="1829370" cy="743966"/>
           </a:xfrm>
           <a:prstGeom prst="rect">
@@ -3953,7 +4294,10 @@
           <a:p>
             <a:pPr algn="ctr"/>
             <a:r>
-              <a:rPr lang="en-US" dirty="0"/>
+              <a:rPr lang="en-US" sz="1600" dirty="0">
+                <a:latin typeface="Times New Roman" panose="02020603050405020304" pitchFamily="18" charset="0"/>
+                <a:cs typeface="Times New Roman" panose="02020603050405020304" pitchFamily="18" charset="0"/>
+              </a:rPr>
               <a:t>Query</a:t>
             </a:r>
           </a:p>
@@ -3973,8 +4317,8 @@
         </p:nvSpPr>
         <p:spPr>
           <a:xfrm>
-            <a:off x="8239826" y="3035935"/>
-            <a:ext cx="3579554" cy="1617207"/>
+            <a:off x="6257775" y="2920105"/>
+            <a:ext cx="2985851" cy="1251125"/>
           </a:xfrm>
           <a:prstGeom prst="rect">
             <a:avLst/>
@@ -4000,23 +4344,28 @@
           <a:p>
             <a:pPr algn="ctr"/>
             <a:r>
-              <a:rPr lang="en-US" dirty="0"/>
+              <a:rPr lang="en-US" sz="1600" dirty="0">
+                <a:latin typeface="Times New Roman" panose="02020603050405020304" pitchFamily="18" charset="0"/>
+                <a:cs typeface="Times New Roman" panose="02020603050405020304" pitchFamily="18" charset="0"/>
+              </a:rPr>
               <a:t>Classify which class the query belongs, like medicine query, health query, etc. Then choose the specific / related book in the DB.</a:t>
             </a:r>
-            <a:endParaRPr lang="en-US" dirty="0">
+            <a:endParaRPr lang="en-US" sz="1600" dirty="0">
               <a:solidFill>
                 <a:srgbClr val="FF0000"/>
               </a:solidFill>
+              <a:latin typeface="Times New Roman" panose="02020603050405020304" pitchFamily="18" charset="0"/>
+              <a:cs typeface="Times New Roman" panose="02020603050405020304" pitchFamily="18" charset="0"/>
             </a:endParaRPr>
           </a:p>
         </p:txBody>
       </p:sp>
       <p:sp>
         <p:nvSpPr>
-          <p:cNvPr id="31" name="Bent-Up Arrow 30">
-            <a:extLst>
-              <a:ext uri="{FF2B5EF4-FFF2-40B4-BE49-F238E27FC236}">
-                <a16:creationId xmlns:a16="http://schemas.microsoft.com/office/drawing/2014/main" id="{244418DB-4735-CAF5-A0AC-6A2874C10108}"/>
+          <p:cNvPr id="37" name="Right Arrow 36">
+            <a:extLst>
+              <a:ext uri="{FF2B5EF4-FFF2-40B4-BE49-F238E27FC236}">
+                <a16:creationId xmlns:a16="http://schemas.microsoft.com/office/drawing/2014/main" id="{3F8A2251-D652-1AF1-AE40-C91F9ACEF673}"/>
               </a:ext>
             </a:extLst>
           </p:cNvPr>
@@ -4024,11 +4373,11 @@
           <p:nvPr/>
         </p:nvSpPr>
         <p:spPr>
-          <a:xfrm rot="16200000">
-            <a:off x="9227501" y="1646335"/>
-            <a:ext cx="1380530" cy="1166011"/>
-          </a:xfrm>
-          <a:prstGeom prst="bentUpArrow">
+          <a:xfrm rot="20071275">
+            <a:off x="6628688" y="4532226"/>
+            <a:ext cx="1077805" cy="333750"/>
+          </a:xfrm>
+          <a:prstGeom prst="rightArrow">
             <a:avLst/>
           </a:prstGeom>
         </p:spPr>
@@ -4053,16 +4402,19 @@
           <a:lstStyle/>
           <a:p>
             <a:pPr algn="ctr"/>
-            <a:endParaRPr lang="en-US" dirty="0"/>
-          </a:p>
-        </p:txBody>
-      </p:sp>
-      <p:sp>
-        <p:nvSpPr>
-          <p:cNvPr id="37" name="Right Arrow 36">
-            <a:extLst>
-              <a:ext uri="{FF2B5EF4-FFF2-40B4-BE49-F238E27FC236}">
-                <a16:creationId xmlns:a16="http://schemas.microsoft.com/office/drawing/2014/main" id="{3F8A2251-D652-1AF1-AE40-C91F9ACEF673}"/>
+            <a:endParaRPr lang="en-US" sz="1600">
+              <a:latin typeface="Times New Roman" panose="02020603050405020304" pitchFamily="18" charset="0"/>
+              <a:cs typeface="Times New Roman" panose="02020603050405020304" pitchFamily="18" charset="0"/>
+            </a:endParaRPr>
+          </a:p>
+        </p:txBody>
+      </p:sp>
+      <p:sp>
+        <p:nvSpPr>
+          <p:cNvPr id="38" name="Right Arrow 37">
+            <a:extLst>
+              <a:ext uri="{FF2B5EF4-FFF2-40B4-BE49-F238E27FC236}">
+                <a16:creationId xmlns:a16="http://schemas.microsoft.com/office/drawing/2014/main" id="{6047153F-C297-A518-1479-B93B0CA2C422}"/>
               </a:ext>
             </a:extLst>
           </p:cNvPr>
@@ -4070,9 +4422,9 @@
           <p:nvPr/>
         </p:nvSpPr>
         <p:spPr>
-          <a:xfrm rot="18492387">
-            <a:off x="8401633" y="5010559"/>
-            <a:ext cx="1173535" cy="480163"/>
+          <a:xfrm rot="16200000">
+            <a:off x="7788318" y="4544815"/>
+            <a:ext cx="954887" cy="357061"/>
           </a:xfrm>
           <a:prstGeom prst="rightArrow">
             <a:avLst/>
@@ -4099,16 +4451,19 @@
           <a:lstStyle/>
           <a:p>
             <a:pPr algn="ctr"/>
-            <a:endParaRPr lang="en-US"/>
-          </a:p>
-        </p:txBody>
-      </p:sp>
-      <p:sp>
-        <p:nvSpPr>
-          <p:cNvPr id="38" name="Right Arrow 37">
-            <a:extLst>
-              <a:ext uri="{FF2B5EF4-FFF2-40B4-BE49-F238E27FC236}">
-                <a16:creationId xmlns:a16="http://schemas.microsoft.com/office/drawing/2014/main" id="{6047153F-C297-A518-1479-B93B0CA2C422}"/>
+            <a:endParaRPr lang="en-US" sz="1600" dirty="0">
+              <a:latin typeface="Times New Roman" panose="02020603050405020304" pitchFamily="18" charset="0"/>
+              <a:cs typeface="Times New Roman" panose="02020603050405020304" pitchFamily="18" charset="0"/>
+            </a:endParaRPr>
+          </a:p>
+        </p:txBody>
+      </p:sp>
+      <p:sp>
+        <p:nvSpPr>
+          <p:cNvPr id="39" name="Rectangle 38">
+            <a:extLst>
+              <a:ext uri="{FF2B5EF4-FFF2-40B4-BE49-F238E27FC236}">
+                <a16:creationId xmlns:a16="http://schemas.microsoft.com/office/drawing/2014/main" id="{6820C0C8-E42C-4FCB-CAB9-1A087DC713EC}"/>
               </a:ext>
             </a:extLst>
           </p:cNvPr>
@@ -4116,9 +4471,273 @@
           <p:nvPr/>
         </p:nvSpPr>
         <p:spPr>
-          <a:xfrm rot="14303900">
-            <a:off x="10271397" y="5100330"/>
-            <a:ext cx="1173535" cy="480163"/>
+          <a:xfrm>
+            <a:off x="3086735" y="2367572"/>
+            <a:ext cx="1957551" cy="887592"/>
+          </a:xfrm>
+          <a:prstGeom prst="rect">
+            <a:avLst/>
+          </a:prstGeom>
+        </p:spPr>
+        <p:style>
+          <a:lnRef idx="2">
+            <a:schemeClr val="accent1">
+              <a:shade val="15000"/>
+            </a:schemeClr>
+          </a:lnRef>
+          <a:fillRef idx="1">
+            <a:schemeClr val="accent1"/>
+          </a:fillRef>
+          <a:effectRef idx="0">
+            <a:schemeClr val="accent1"/>
+          </a:effectRef>
+          <a:fontRef idx="minor">
+            <a:schemeClr val="lt1"/>
+          </a:fontRef>
+        </p:style>
+        <p:txBody>
+          <a:bodyPr rtlCol="0" anchor="ctr"/>
+          <a:lstStyle/>
+          <a:p>
+            <a:pPr algn="ctr"/>
+            <a:r>
+              <a:rPr lang="en-US" sz="1600" dirty="0">
+                <a:latin typeface="Times New Roman" panose="02020603050405020304" pitchFamily="18" charset="0"/>
+                <a:cs typeface="Times New Roman" panose="02020603050405020304" pitchFamily="18" charset="0"/>
+              </a:rPr>
+              <a:t>Prompt</a:t>
+            </a:r>
+          </a:p>
+        </p:txBody>
+      </p:sp>
+      <p:sp>
+        <p:nvSpPr>
+          <p:cNvPr id="40" name="Down Arrow 39">
+            <a:extLst>
+              <a:ext uri="{FF2B5EF4-FFF2-40B4-BE49-F238E27FC236}">
+                <a16:creationId xmlns:a16="http://schemas.microsoft.com/office/drawing/2014/main" id="{4140C6DD-5DDF-AB5F-CA87-384D88EA89D6}"/>
+              </a:ext>
+            </a:extLst>
+          </p:cNvPr>
+          <p:cNvSpPr/>
+          <p:nvPr/>
+        </p:nvSpPr>
+        <p:spPr>
+          <a:xfrm rot="3044202">
+            <a:off x="3495497" y="3267085"/>
+            <a:ext cx="407275" cy="914400"/>
+          </a:xfrm>
+          <a:prstGeom prst="downArrow">
+            <a:avLst/>
+          </a:prstGeom>
+        </p:spPr>
+        <p:style>
+          <a:lnRef idx="2">
+            <a:schemeClr val="accent6"/>
+          </a:lnRef>
+          <a:fillRef idx="1">
+            <a:schemeClr val="lt1"/>
+          </a:fillRef>
+          <a:effectRef idx="0">
+            <a:schemeClr val="accent6"/>
+          </a:effectRef>
+          <a:fontRef idx="minor">
+            <a:schemeClr val="dk1"/>
+          </a:fontRef>
+        </p:style>
+        <p:txBody>
+          <a:bodyPr rtlCol="0" anchor="ctr"/>
+          <a:lstStyle/>
+          <a:p>
+            <a:pPr algn="ctr"/>
+            <a:endParaRPr lang="en-US" sz="1600">
+              <a:latin typeface="Times New Roman" panose="02020603050405020304" pitchFamily="18" charset="0"/>
+              <a:cs typeface="Times New Roman" panose="02020603050405020304" pitchFamily="18" charset="0"/>
+            </a:endParaRPr>
+          </a:p>
+        </p:txBody>
+      </p:sp>
+      <p:sp>
+        <p:nvSpPr>
+          <p:cNvPr id="41" name="Rounded Rectangle 40">
+            <a:extLst>
+              <a:ext uri="{FF2B5EF4-FFF2-40B4-BE49-F238E27FC236}">
+                <a16:creationId xmlns:a16="http://schemas.microsoft.com/office/drawing/2014/main" id="{EA02C83E-9782-7937-5E1D-3C998548D696}"/>
+              </a:ext>
+            </a:extLst>
+          </p:cNvPr>
+          <p:cNvSpPr/>
+          <p:nvPr/>
+        </p:nvSpPr>
+        <p:spPr>
+          <a:xfrm>
+            <a:off x="2098522" y="4141016"/>
+            <a:ext cx="1853400" cy="1240109"/>
+          </a:xfrm>
+          <a:prstGeom prst="roundRect">
+            <a:avLst/>
+          </a:prstGeom>
+        </p:spPr>
+        <p:style>
+          <a:lnRef idx="2">
+            <a:schemeClr val="accent6"/>
+          </a:lnRef>
+          <a:fillRef idx="1">
+            <a:schemeClr val="lt1"/>
+          </a:fillRef>
+          <a:effectRef idx="0">
+            <a:schemeClr val="accent6"/>
+          </a:effectRef>
+          <a:fontRef idx="minor">
+            <a:schemeClr val="dk1"/>
+          </a:fontRef>
+        </p:style>
+        <p:txBody>
+          <a:bodyPr rtlCol="0" anchor="ctr"/>
+          <a:lstStyle/>
+          <a:p>
+            <a:r>
+              <a:rPr lang="en-US" sz="1600" dirty="0">
+                <a:latin typeface="Times New Roman" panose="02020603050405020304" pitchFamily="18" charset="0"/>
+                <a:cs typeface="Times New Roman" panose="02020603050405020304" pitchFamily="18" charset="0"/>
+              </a:rPr>
+              <a:t>Meta data contains the information where these resource are from</a:t>
+            </a:r>
+            <a:endParaRPr lang="en-US" sz="1600" dirty="0">
+              <a:solidFill>
+                <a:srgbClr val="FF0000"/>
+              </a:solidFill>
+              <a:latin typeface="Times New Roman" panose="02020603050405020304" pitchFamily="18" charset="0"/>
+              <a:cs typeface="Times New Roman" panose="02020603050405020304" pitchFamily="18" charset="0"/>
+            </a:endParaRPr>
+          </a:p>
+        </p:txBody>
+      </p:sp>
+      <p:sp>
+        <p:nvSpPr>
+          <p:cNvPr id="42" name="Magnetic Disk 41">
+            <a:extLst>
+              <a:ext uri="{FF2B5EF4-FFF2-40B4-BE49-F238E27FC236}">
+                <a16:creationId xmlns:a16="http://schemas.microsoft.com/office/drawing/2014/main" id="{12650C7B-1DF6-2976-BD38-8F3A0A5F4EF9}"/>
+              </a:ext>
+            </a:extLst>
+          </p:cNvPr>
+          <p:cNvSpPr/>
+          <p:nvPr/>
+        </p:nvSpPr>
+        <p:spPr>
+          <a:xfrm>
+            <a:off x="245539" y="5158017"/>
+            <a:ext cx="1529255" cy="589464"/>
+          </a:xfrm>
+          <a:prstGeom prst="flowChartMagneticDisk">
+            <a:avLst/>
+          </a:prstGeom>
+        </p:spPr>
+        <p:style>
+          <a:lnRef idx="2">
+            <a:schemeClr val="accent2">
+              <a:shade val="15000"/>
+            </a:schemeClr>
+          </a:lnRef>
+          <a:fillRef idx="1">
+            <a:schemeClr val="accent2"/>
+          </a:fillRef>
+          <a:effectRef idx="0">
+            <a:schemeClr val="accent2"/>
+          </a:effectRef>
+          <a:fontRef idx="minor">
+            <a:schemeClr val="lt1"/>
+          </a:fontRef>
+        </p:style>
+        <p:txBody>
+          <a:bodyPr rtlCol="0" anchor="ctr"/>
+          <a:lstStyle/>
+          <a:p>
+            <a:pPr algn="ctr"/>
+            <a:r>
+              <a:rPr lang="en-US" sz="1600" dirty="0">
+                <a:latin typeface="Times New Roman" panose="02020603050405020304" pitchFamily="18" charset="0"/>
+                <a:cs typeface="Times New Roman" panose="02020603050405020304" pitchFamily="18" charset="0"/>
+              </a:rPr>
+              <a:t>LLM</a:t>
+            </a:r>
+          </a:p>
+        </p:txBody>
+      </p:sp>
+      <p:sp>
+        <p:nvSpPr>
+          <p:cNvPr id="45" name="Hexagon 44">
+            <a:extLst>
+              <a:ext uri="{FF2B5EF4-FFF2-40B4-BE49-F238E27FC236}">
+                <a16:creationId xmlns:a16="http://schemas.microsoft.com/office/drawing/2014/main" id="{74024AF5-9463-2574-1637-C9C035A30817}"/>
+              </a:ext>
+            </a:extLst>
+          </p:cNvPr>
+          <p:cNvSpPr/>
+          <p:nvPr/>
+        </p:nvSpPr>
+        <p:spPr>
+          <a:xfrm>
+            <a:off x="50139" y="2086947"/>
+            <a:ext cx="1734770" cy="1403171"/>
+          </a:xfrm>
+          <a:prstGeom prst="hexagon">
+            <a:avLst/>
+          </a:prstGeom>
+        </p:spPr>
+        <p:style>
+          <a:lnRef idx="2">
+            <a:schemeClr val="accent6"/>
+          </a:lnRef>
+          <a:fillRef idx="1">
+            <a:schemeClr val="lt1"/>
+          </a:fillRef>
+          <a:effectRef idx="0">
+            <a:schemeClr val="accent6"/>
+          </a:effectRef>
+          <a:fontRef idx="minor">
+            <a:schemeClr val="dk1"/>
+          </a:fontRef>
+        </p:style>
+        <p:txBody>
+          <a:bodyPr rtlCol="0" anchor="ctr"/>
+          <a:lstStyle/>
+          <a:p>
+            <a:pPr algn="ctr"/>
+            <a:r>
+              <a:rPr lang="en-US" sz="1600" dirty="0">
+                <a:latin typeface="Times New Roman" panose="02020603050405020304" pitchFamily="18" charset="0"/>
+                <a:cs typeface="Times New Roman" panose="02020603050405020304" pitchFamily="18" charset="0"/>
+              </a:rPr>
+              <a:t>Generate the response</a:t>
+            </a:r>
+            <a:endParaRPr lang="en-US" sz="1600" dirty="0">
+              <a:solidFill>
+                <a:srgbClr val="FF0000"/>
+              </a:solidFill>
+              <a:latin typeface="Times New Roman" panose="02020603050405020304" pitchFamily="18" charset="0"/>
+              <a:cs typeface="Times New Roman" panose="02020603050405020304" pitchFamily="18" charset="0"/>
+            </a:endParaRPr>
+          </a:p>
+        </p:txBody>
+      </p:sp>
+      <p:sp>
+        <p:nvSpPr>
+          <p:cNvPr id="46" name="Right Arrow 45">
+            <a:extLst>
+              <a:ext uri="{FF2B5EF4-FFF2-40B4-BE49-F238E27FC236}">
+                <a16:creationId xmlns:a16="http://schemas.microsoft.com/office/drawing/2014/main" id="{D3EA469C-4D62-162F-3C89-AD40C1B2ED16}"/>
+              </a:ext>
+            </a:extLst>
+          </p:cNvPr>
+          <p:cNvSpPr/>
+          <p:nvPr/>
+        </p:nvSpPr>
+        <p:spPr>
+          <a:xfrm rot="13871326">
+            <a:off x="4518041" y="3788422"/>
+            <a:ext cx="1810148" cy="624524"/>
           </a:xfrm>
           <a:prstGeom prst="rightArrow">
             <a:avLst/>
@@ -4145,16 +4764,19 @@
           <a:lstStyle/>
           <a:p>
             <a:pPr algn="ctr"/>
-            <a:endParaRPr lang="en-US"/>
-          </a:p>
-        </p:txBody>
-      </p:sp>
-      <p:sp>
-        <p:nvSpPr>
-          <p:cNvPr id="39" name="Rectangle 38">
-            <a:extLst>
-              <a:ext uri="{FF2B5EF4-FFF2-40B4-BE49-F238E27FC236}">
-                <a16:creationId xmlns:a16="http://schemas.microsoft.com/office/drawing/2014/main" id="{6820C0C8-E42C-4FCB-CAB9-1A087DC713EC}"/>
+            <a:endParaRPr lang="en-US" sz="1600">
+              <a:latin typeface="Times New Roman" panose="02020603050405020304" pitchFamily="18" charset="0"/>
+              <a:cs typeface="Times New Roman" panose="02020603050405020304" pitchFamily="18" charset="0"/>
+            </a:endParaRPr>
+          </a:p>
+        </p:txBody>
+      </p:sp>
+      <p:sp>
+        <p:nvSpPr>
+          <p:cNvPr id="47" name="Right Arrow 46">
+            <a:extLst>
+              <a:ext uri="{FF2B5EF4-FFF2-40B4-BE49-F238E27FC236}">
+                <a16:creationId xmlns:a16="http://schemas.microsoft.com/office/drawing/2014/main" id="{481F80E5-F2AE-8150-6503-89E161D76FF2}"/>
               </a:ext>
             </a:extLst>
           </p:cNvPr>
@@ -4162,11 +4784,158 @@
           <p:nvPr/>
         </p:nvSpPr>
         <p:spPr>
+          <a:xfrm rot="8429116">
+            <a:off x="5059634" y="1832036"/>
+            <a:ext cx="1681370" cy="624524"/>
+          </a:xfrm>
+          <a:prstGeom prst="rightArrow">
+            <a:avLst/>
+          </a:prstGeom>
+        </p:spPr>
+        <p:style>
+          <a:lnRef idx="2">
+            <a:schemeClr val="accent4">
+              <a:shade val="15000"/>
+            </a:schemeClr>
+          </a:lnRef>
+          <a:fillRef idx="1">
+            <a:schemeClr val="accent4"/>
+          </a:fillRef>
+          <a:effectRef idx="0">
+            <a:schemeClr val="accent4"/>
+          </a:effectRef>
+          <a:fontRef idx="minor">
+            <a:schemeClr val="lt1"/>
+          </a:fontRef>
+        </p:style>
+        <p:txBody>
+          <a:bodyPr rtlCol="0" anchor="ctr"/>
+          <a:lstStyle/>
+          <a:p>
+            <a:pPr algn="ctr"/>
+            <a:endParaRPr lang="en-US" sz="1600">
+              <a:latin typeface="Times New Roman" panose="02020603050405020304" pitchFamily="18" charset="0"/>
+              <a:cs typeface="Times New Roman" panose="02020603050405020304" pitchFamily="18" charset="0"/>
+            </a:endParaRPr>
+          </a:p>
+        </p:txBody>
+      </p:sp>
+      <p:sp>
+        <p:nvSpPr>
+          <p:cNvPr id="48" name="Right Arrow 47">
+            <a:extLst>
+              <a:ext uri="{FF2B5EF4-FFF2-40B4-BE49-F238E27FC236}">
+                <a16:creationId xmlns:a16="http://schemas.microsoft.com/office/drawing/2014/main" id="{5D932EAC-D0DA-9953-90CB-1D2A39EB538A}"/>
+              </a:ext>
+            </a:extLst>
+          </p:cNvPr>
+          <p:cNvSpPr/>
+          <p:nvPr/>
+        </p:nvSpPr>
+        <p:spPr>
+          <a:xfrm rot="10800000">
+            <a:off x="1869680" y="2468338"/>
+            <a:ext cx="1147457" cy="624524"/>
+          </a:xfrm>
+          <a:prstGeom prst="rightArrow">
+            <a:avLst/>
+          </a:prstGeom>
+        </p:spPr>
+        <p:style>
+          <a:lnRef idx="2">
+            <a:schemeClr val="accent4">
+              <a:shade val="15000"/>
+            </a:schemeClr>
+          </a:lnRef>
+          <a:fillRef idx="1">
+            <a:schemeClr val="accent4"/>
+          </a:fillRef>
+          <a:effectRef idx="0">
+            <a:schemeClr val="accent4"/>
+          </a:effectRef>
+          <a:fontRef idx="minor">
+            <a:schemeClr val="lt1"/>
+          </a:fontRef>
+        </p:style>
+        <p:txBody>
+          <a:bodyPr rtlCol="0" anchor="ctr"/>
+          <a:lstStyle/>
+          <a:p>
+            <a:pPr algn="ctr"/>
+            <a:endParaRPr lang="en-US" sz="1600" dirty="0">
+              <a:latin typeface="Times New Roman" panose="02020603050405020304" pitchFamily="18" charset="0"/>
+              <a:cs typeface="Times New Roman" panose="02020603050405020304" pitchFamily="18" charset="0"/>
+            </a:endParaRPr>
+          </a:p>
+        </p:txBody>
+      </p:sp>
+      <p:sp>
+        <p:nvSpPr>
+          <p:cNvPr id="49" name="Right Arrow 48">
+            <a:extLst>
+              <a:ext uri="{FF2B5EF4-FFF2-40B4-BE49-F238E27FC236}">
+                <a16:creationId xmlns:a16="http://schemas.microsoft.com/office/drawing/2014/main" id="{508B15A5-B526-EDF6-FF5E-7BE93933AA7D}"/>
+              </a:ext>
+            </a:extLst>
+          </p:cNvPr>
+          <p:cNvSpPr/>
+          <p:nvPr/>
+        </p:nvSpPr>
+        <p:spPr>
+          <a:xfrm rot="16200000">
+            <a:off x="255252" y="4103472"/>
+            <a:ext cx="1403170" cy="424283"/>
+          </a:xfrm>
+          <a:prstGeom prst="rightArrow">
+            <a:avLst/>
+          </a:prstGeom>
+        </p:spPr>
+        <p:style>
+          <a:lnRef idx="2">
+            <a:schemeClr val="accent4">
+              <a:shade val="15000"/>
+            </a:schemeClr>
+          </a:lnRef>
+          <a:fillRef idx="1">
+            <a:schemeClr val="accent4"/>
+          </a:fillRef>
+          <a:effectRef idx="0">
+            <a:schemeClr val="accent4"/>
+          </a:effectRef>
+          <a:fontRef idx="minor">
+            <a:schemeClr val="lt1"/>
+          </a:fontRef>
+        </p:style>
+        <p:txBody>
+          <a:bodyPr rtlCol="0" anchor="ctr"/>
+          <a:lstStyle/>
+          <a:p>
+            <a:pPr algn="ctr"/>
+            <a:endParaRPr lang="en-US" sz="1600">
+              <a:latin typeface="Times New Roman" panose="02020603050405020304" pitchFamily="18" charset="0"/>
+              <a:cs typeface="Times New Roman" panose="02020603050405020304" pitchFamily="18" charset="0"/>
+            </a:endParaRPr>
+          </a:p>
+        </p:txBody>
+      </p:sp>
+      <p:sp>
+        <p:nvSpPr>
+          <p:cNvPr id="13" name="Rounded Rectangle 12">
+            <a:extLst>
+              <a:ext uri="{FF2B5EF4-FFF2-40B4-BE49-F238E27FC236}">
+                <a16:creationId xmlns:a16="http://schemas.microsoft.com/office/drawing/2014/main" id="{DE4D50B5-386B-58C8-23E0-35C68460F60D}"/>
+              </a:ext>
+            </a:extLst>
+          </p:cNvPr>
+          <p:cNvSpPr/>
+          <p:nvPr/>
+        </p:nvSpPr>
+        <p:spPr>
           <a:xfrm>
-            <a:off x="4213955" y="3041693"/>
-            <a:ext cx="1957551" cy="887592"/>
-          </a:xfrm>
-          <a:prstGeom prst="rect">
+            <a:off x="9760494" y="290655"/>
+            <a:ext cx="1741890" cy="935417"/>
+          </a:xfrm>
+          <a:prstGeom prst="roundRect">
             <a:avLst/>
           </a:prstGeom>
         </p:spPr>
@@ -4192,18 +4961,21 @@
           <a:p>
             <a:pPr algn="ctr"/>
             <a:r>
-              <a:rPr lang="en-US" dirty="0"/>
-              <a:t>Prompt</a:t>
-            </a:r>
-          </a:p>
-        </p:txBody>
-      </p:sp>
-      <p:sp>
-        <p:nvSpPr>
-          <p:cNvPr id="40" name="Down Arrow 39">
-            <a:extLst>
-              <a:ext uri="{FF2B5EF4-FFF2-40B4-BE49-F238E27FC236}">
-                <a16:creationId xmlns:a16="http://schemas.microsoft.com/office/drawing/2014/main" id="{4140C6DD-5DDF-AB5F-CA87-384D88EA89D6}"/>
+              <a:rPr lang="en-US" sz="1600" dirty="0">
+                <a:latin typeface="Times New Roman" panose="02020603050405020304" pitchFamily="18" charset="0"/>
+                <a:cs typeface="Times New Roman" panose="02020603050405020304" pitchFamily="18" charset="0"/>
+              </a:rPr>
+              <a:t>Collected queries</a:t>
+            </a:r>
+          </a:p>
+        </p:txBody>
+      </p:sp>
+      <p:sp>
+        <p:nvSpPr>
+          <p:cNvPr id="14" name="Right Arrow 13">
+            <a:extLst>
+              <a:ext uri="{FF2B5EF4-FFF2-40B4-BE49-F238E27FC236}">
+                <a16:creationId xmlns:a16="http://schemas.microsoft.com/office/drawing/2014/main" id="{A19A6BA6-9039-A544-61DB-83FAEB108407}"/>
               </a:ext>
             </a:extLst>
           </p:cNvPr>
@@ -4211,26 +4983,77 @@
           <p:nvPr/>
         </p:nvSpPr>
         <p:spPr>
-          <a:xfrm>
-            <a:off x="5052847" y="4046482"/>
-            <a:ext cx="407275" cy="914400"/>
-          </a:xfrm>
-          <a:prstGeom prst="downArrow">
+          <a:xfrm rot="16200000">
+            <a:off x="6499329" y="1845436"/>
+            <a:ext cx="1287542" cy="624524"/>
+          </a:xfrm>
+          <a:prstGeom prst="rightArrow">
             <a:avLst/>
           </a:prstGeom>
         </p:spPr>
         <p:style>
           <a:lnRef idx="2">
-            <a:schemeClr val="accent6"/>
+            <a:schemeClr val="accent4">
+              <a:shade val="15000"/>
+            </a:schemeClr>
           </a:lnRef>
           <a:fillRef idx="1">
+            <a:schemeClr val="accent4"/>
+          </a:fillRef>
+          <a:effectRef idx="0">
+            <a:schemeClr val="accent4"/>
+          </a:effectRef>
+          <a:fontRef idx="minor">
             <a:schemeClr val="lt1"/>
+          </a:fontRef>
+        </p:style>
+        <p:txBody>
+          <a:bodyPr rtlCol="0" anchor="ctr"/>
+          <a:lstStyle/>
+          <a:p>
+            <a:pPr algn="ctr"/>
+            <a:endParaRPr lang="en-US" sz="1600">
+              <a:latin typeface="Times New Roman" panose="02020603050405020304" pitchFamily="18" charset="0"/>
+              <a:cs typeface="Times New Roman" panose="02020603050405020304" pitchFamily="18" charset="0"/>
+            </a:endParaRPr>
+          </a:p>
+        </p:txBody>
+      </p:sp>
+      <p:sp>
+        <p:nvSpPr>
+          <p:cNvPr id="17" name="Curved Down Arrow 16">
+            <a:extLst>
+              <a:ext uri="{FF2B5EF4-FFF2-40B4-BE49-F238E27FC236}">
+                <a16:creationId xmlns:a16="http://schemas.microsoft.com/office/drawing/2014/main" id="{483E922E-AB9E-F333-3EFD-D1EBDB1BE31C}"/>
+              </a:ext>
+            </a:extLst>
+          </p:cNvPr>
+          <p:cNvSpPr/>
+          <p:nvPr/>
+        </p:nvSpPr>
+        <p:spPr>
+          <a:xfrm rot="10800000" flipV="1">
+            <a:off x="7440373" y="29395"/>
+            <a:ext cx="2243764" cy="797022"/>
+          </a:xfrm>
+          <a:prstGeom prst="curvedDownArrow">
+            <a:avLst/>
+          </a:prstGeom>
+        </p:spPr>
+        <p:style>
+          <a:lnRef idx="2">
+            <a:schemeClr val="accent6">
+              <a:shade val="15000"/>
+            </a:schemeClr>
+          </a:lnRef>
+          <a:fillRef idx="1">
+            <a:schemeClr val="accent6"/>
           </a:fillRef>
           <a:effectRef idx="0">
             <a:schemeClr val="accent6"/>
           </a:effectRef>
           <a:fontRef idx="minor">
-            <a:schemeClr val="dk1"/>
+            <a:schemeClr val="lt1"/>
           </a:fontRef>
         </p:style>
         <p:txBody>
@@ -4238,16 +5061,22 @@
           <a:lstStyle/>
           <a:p>
             <a:pPr algn="ctr"/>
-            <a:endParaRPr lang="en-US"/>
-          </a:p>
-        </p:txBody>
-      </p:sp>
-      <p:sp>
-        <p:nvSpPr>
-          <p:cNvPr id="41" name="Rounded Rectangle 40">
-            <a:extLst>
-              <a:ext uri="{FF2B5EF4-FFF2-40B4-BE49-F238E27FC236}">
-                <a16:creationId xmlns:a16="http://schemas.microsoft.com/office/drawing/2014/main" id="{EA02C83E-9782-7937-5E1D-3C998548D696}"/>
+            <a:endParaRPr lang="en-US" sz="1600" dirty="0">
+              <a:solidFill>
+                <a:schemeClr val="tx1"/>
+              </a:solidFill>
+              <a:latin typeface="Times New Roman" panose="02020603050405020304" pitchFamily="18" charset="0"/>
+              <a:cs typeface="Times New Roman" panose="02020603050405020304" pitchFamily="18" charset="0"/>
+            </a:endParaRPr>
+          </a:p>
+        </p:txBody>
+      </p:sp>
+      <p:sp>
+        <p:nvSpPr>
+          <p:cNvPr id="19" name="Curved Down Arrow 18">
+            <a:extLst>
+              <a:ext uri="{FF2B5EF4-FFF2-40B4-BE49-F238E27FC236}">
+                <a16:creationId xmlns:a16="http://schemas.microsoft.com/office/drawing/2014/main" id="{E3308C53-937D-0753-1050-34DEF19F0D25}"/>
               </a:ext>
             </a:extLst>
           </p:cNvPr>
@@ -4255,50 +5084,89 @@
           <p:nvPr/>
         </p:nvSpPr>
         <p:spPr>
-          <a:xfrm>
-            <a:off x="4012323" y="5052112"/>
-            <a:ext cx="2577668" cy="1240109"/>
-          </a:xfrm>
-          <a:prstGeom prst="roundRect">
+          <a:xfrm rot="10800000" flipH="1">
+            <a:off x="7549149" y="1573307"/>
+            <a:ext cx="2097916" cy="834371"/>
+          </a:xfrm>
+          <a:prstGeom prst="curvedDownArrow">
             <a:avLst/>
           </a:prstGeom>
         </p:spPr>
         <p:style>
           <a:lnRef idx="2">
-            <a:schemeClr val="accent6"/>
+            <a:schemeClr val="accent6">
+              <a:shade val="15000"/>
+            </a:schemeClr>
           </a:lnRef>
           <a:fillRef idx="1">
-            <a:schemeClr val="lt1"/>
+            <a:schemeClr val="accent6"/>
           </a:fillRef>
           <a:effectRef idx="0">
             <a:schemeClr val="accent6"/>
           </a:effectRef>
           <a:fontRef idx="minor">
-            <a:schemeClr val="dk1"/>
+            <a:schemeClr val="lt1"/>
           </a:fontRef>
         </p:style>
         <p:txBody>
           <a:bodyPr rtlCol="0" anchor="ctr"/>
           <a:lstStyle/>
           <a:p>
-            <a:r>
-              <a:rPr lang="en-US" dirty="0"/>
-              <a:t>Meta data contains the information where these resource are from</a:t>
-            </a:r>
-            <a:endParaRPr lang="en-US" dirty="0">
+            <a:pPr algn="ctr"/>
+            <a:endParaRPr lang="en-US" sz="1600">
               <a:solidFill>
-                <a:srgbClr val="FF0000"/>
+                <a:schemeClr val="tx1"/>
               </a:solidFill>
+              <a:latin typeface="Times New Roman" panose="02020603050405020304" pitchFamily="18" charset="0"/>
+              <a:cs typeface="Times New Roman" panose="02020603050405020304" pitchFamily="18" charset="0"/>
             </a:endParaRPr>
           </a:p>
         </p:txBody>
       </p:sp>
       <p:sp>
         <p:nvSpPr>
-          <p:cNvPr id="42" name="Magnetic Disk 41">
-            <a:extLst>
-              <a:ext uri="{FF2B5EF4-FFF2-40B4-BE49-F238E27FC236}">
-                <a16:creationId xmlns:a16="http://schemas.microsoft.com/office/drawing/2014/main" id="{12650C7B-1DF6-2976-BD38-8F3A0A5F4EF9}"/>
+          <p:cNvPr id="20" name="TextBox 19">
+            <a:extLst>
+              <a:ext uri="{FF2B5EF4-FFF2-40B4-BE49-F238E27FC236}">
+                <a16:creationId xmlns:a16="http://schemas.microsoft.com/office/drawing/2014/main" id="{76CF7558-341D-BC85-79AB-A69025658A1B}"/>
+              </a:ext>
+            </a:extLst>
+          </p:cNvPr>
+          <p:cNvSpPr txBox="1"/>
+          <p:nvPr/>
+        </p:nvSpPr>
+        <p:spPr>
+          <a:xfrm>
+            <a:off x="7702191" y="776283"/>
+            <a:ext cx="1905589" cy="830997"/>
+          </a:xfrm>
+          <a:prstGeom prst="rect">
+            <a:avLst/>
+          </a:prstGeom>
+          <a:noFill/>
+        </p:spPr>
+        <p:txBody>
+          <a:bodyPr wrap="square" rtlCol="0">
+            <a:spAutoFit/>
+          </a:bodyPr>
+          <a:lstStyle/>
+          <a:p>
+            <a:r>
+              <a:rPr lang="en-US" sz="1600" dirty="0">
+                <a:latin typeface="Times New Roman" panose="02020603050405020304" pitchFamily="18" charset="0"/>
+                <a:cs typeface="Times New Roman" panose="02020603050405020304" pitchFamily="18" charset="0"/>
+              </a:rPr>
+              <a:t>Use vote method to get the most likely category</a:t>
+            </a:r>
+          </a:p>
+        </p:txBody>
+      </p:sp>
+      <p:sp>
+        <p:nvSpPr>
+          <p:cNvPr id="22" name="Rounded Rectangle 21">
+            <a:extLst>
+              <a:ext uri="{FF2B5EF4-FFF2-40B4-BE49-F238E27FC236}">
+                <a16:creationId xmlns:a16="http://schemas.microsoft.com/office/drawing/2014/main" id="{42EDE4C3-2F54-A881-D95C-2ADBC3B86DD6}"/>
               </a:ext>
             </a:extLst>
           </p:cNvPr>
@@ -4307,10 +5175,152 @@
         </p:nvSpPr>
         <p:spPr>
           <a:xfrm>
-            <a:off x="427674" y="5642725"/>
-            <a:ext cx="1529255" cy="589464"/>
-          </a:xfrm>
-          <a:prstGeom prst="flowChartMagneticDisk">
+            <a:off x="9760494" y="1257947"/>
+            <a:ext cx="1741890" cy="935417"/>
+          </a:xfrm>
+          <a:prstGeom prst="roundRect">
+            <a:avLst/>
+          </a:prstGeom>
+        </p:spPr>
+        <p:style>
+          <a:lnRef idx="2">
+            <a:schemeClr val="accent1">
+              <a:shade val="15000"/>
+            </a:schemeClr>
+          </a:lnRef>
+          <a:fillRef idx="1">
+            <a:schemeClr val="accent1"/>
+          </a:fillRef>
+          <a:effectRef idx="0">
+            <a:schemeClr val="accent1"/>
+          </a:effectRef>
+          <a:fontRef idx="minor">
+            <a:schemeClr val="lt1"/>
+          </a:fontRef>
+        </p:style>
+        <p:txBody>
+          <a:bodyPr rtlCol="0" anchor="ctr"/>
+          <a:lstStyle/>
+          <a:p>
+            <a:pPr algn="ctr"/>
+            <a:r>
+              <a:rPr lang="en-US" sz="1600" dirty="0">
+                <a:latin typeface="Times New Roman" panose="02020603050405020304" pitchFamily="18" charset="0"/>
+                <a:cs typeface="Times New Roman" panose="02020603050405020304" pitchFamily="18" charset="0"/>
+              </a:rPr>
+              <a:t>Query-label pair</a:t>
+            </a:r>
+          </a:p>
+        </p:txBody>
+      </p:sp>
+      <p:sp>
+        <p:nvSpPr>
+          <p:cNvPr id="24" name="Bent Arrow 23">
+            <a:extLst>
+              <a:ext uri="{FF2B5EF4-FFF2-40B4-BE49-F238E27FC236}">
+                <a16:creationId xmlns:a16="http://schemas.microsoft.com/office/drawing/2014/main" id="{C233722C-4793-0E18-A531-D4A7CD9D2B99}"/>
+              </a:ext>
+            </a:extLst>
+          </p:cNvPr>
+          <p:cNvSpPr/>
+          <p:nvPr/>
+        </p:nvSpPr>
+        <p:spPr>
+          <a:xfrm rot="10800000">
+            <a:off x="9552018" y="2322246"/>
+            <a:ext cx="1329408" cy="3697968"/>
+          </a:xfrm>
+          <a:prstGeom prst="bentArrow">
+            <a:avLst/>
+          </a:prstGeom>
+        </p:spPr>
+        <p:style>
+          <a:lnRef idx="2">
+            <a:schemeClr val="accent6">
+              <a:shade val="15000"/>
+            </a:schemeClr>
+          </a:lnRef>
+          <a:fillRef idx="1">
+            <a:schemeClr val="accent6"/>
+          </a:fillRef>
+          <a:effectRef idx="0">
+            <a:schemeClr val="accent6"/>
+          </a:effectRef>
+          <a:fontRef idx="minor">
+            <a:schemeClr val="lt1"/>
+          </a:fontRef>
+        </p:style>
+        <p:txBody>
+          <a:bodyPr rtlCol="0" anchor="ctr"/>
+          <a:lstStyle/>
+          <a:p>
+            <a:pPr algn="ctr"/>
+            <a:endParaRPr lang="en-US" sz="1600">
+              <a:solidFill>
+                <a:schemeClr val="tx1"/>
+              </a:solidFill>
+              <a:latin typeface="Times New Roman" panose="02020603050405020304" pitchFamily="18" charset="0"/>
+              <a:cs typeface="Times New Roman" panose="02020603050405020304" pitchFamily="18" charset="0"/>
+            </a:endParaRPr>
+          </a:p>
+        </p:txBody>
+      </p:sp>
+      <p:sp>
+        <p:nvSpPr>
+          <p:cNvPr id="25" name="TextBox 24">
+            <a:extLst>
+              <a:ext uri="{FF2B5EF4-FFF2-40B4-BE49-F238E27FC236}">
+                <a16:creationId xmlns:a16="http://schemas.microsoft.com/office/drawing/2014/main" id="{7C58BB1E-314B-6FB4-80BD-A1B940D4F21B}"/>
+              </a:ext>
+            </a:extLst>
+          </p:cNvPr>
+          <p:cNvSpPr txBox="1"/>
+          <p:nvPr/>
+        </p:nvSpPr>
+        <p:spPr>
+          <a:xfrm>
+            <a:off x="8616065" y="4357919"/>
+            <a:ext cx="1642998" cy="830997"/>
+          </a:xfrm>
+          <a:prstGeom prst="rect">
+            <a:avLst/>
+          </a:prstGeom>
+          <a:noFill/>
+        </p:spPr>
+        <p:txBody>
+          <a:bodyPr wrap="square" rtlCol="0">
+            <a:spAutoFit/>
+          </a:bodyPr>
+          <a:lstStyle/>
+          <a:p>
+            <a:r>
+              <a:rPr lang="en-US" sz="1600" dirty="0">
+                <a:latin typeface="Times New Roman" panose="02020603050405020304" pitchFamily="18" charset="0"/>
+                <a:cs typeface="Times New Roman" panose="02020603050405020304" pitchFamily="18" charset="0"/>
+              </a:rPr>
+              <a:t>Train the text classification model</a:t>
+            </a:r>
+          </a:p>
+        </p:txBody>
+      </p:sp>
+      <p:sp>
+        <p:nvSpPr>
+          <p:cNvPr id="4" name="Can 3">
+            <a:extLst>
+              <a:ext uri="{FF2B5EF4-FFF2-40B4-BE49-F238E27FC236}">
+                <a16:creationId xmlns:a16="http://schemas.microsoft.com/office/drawing/2014/main" id="{F11F946B-04B2-E6B5-3B6E-B973DC183799}"/>
+              </a:ext>
+            </a:extLst>
+          </p:cNvPr>
+          <p:cNvSpPr/>
+          <p:nvPr/>
+        </p:nvSpPr>
+        <p:spPr>
+          <a:xfrm>
+            <a:off x="6377028" y="752027"/>
+            <a:ext cx="1082566" cy="388947"/>
+          </a:xfrm>
+          <a:prstGeom prst="can">
             <a:avLst/>
           </a:prstGeom>
         </p:spPr>
@@ -4336,18 +5346,21 @@
           <a:p>
             <a:pPr algn="ctr"/>
             <a:r>
-              <a:rPr lang="en-US" dirty="0"/>
-              <a:t>LLM</a:t>
-            </a:r>
-          </a:p>
-        </p:txBody>
-      </p:sp>
-      <p:sp>
-        <p:nvSpPr>
-          <p:cNvPr id="45" name="Hexagon 44">
-            <a:extLst>
-              <a:ext uri="{FF2B5EF4-FFF2-40B4-BE49-F238E27FC236}">
-                <a16:creationId xmlns:a16="http://schemas.microsoft.com/office/drawing/2014/main" id="{74024AF5-9463-2574-1637-C9C035A30817}"/>
+              <a:rPr lang="en-US" sz="1600" dirty="0">
+                <a:latin typeface="Times New Roman" panose="02020603050405020304" pitchFamily="18" charset="0"/>
+                <a:cs typeface="Times New Roman" panose="02020603050405020304" pitchFamily="18" charset="0"/>
+              </a:rPr>
+              <a:t>DB</a:t>
+            </a:r>
+          </a:p>
+        </p:txBody>
+      </p:sp>
+      <p:sp>
+        <p:nvSpPr>
+          <p:cNvPr id="18" name="Can 17">
+            <a:extLst>
+              <a:ext uri="{FF2B5EF4-FFF2-40B4-BE49-F238E27FC236}">
+                <a16:creationId xmlns:a16="http://schemas.microsoft.com/office/drawing/2014/main" id="{502100F4-5CDD-DEEC-FF61-95220D16BCE3}"/>
               </a:ext>
             </a:extLst>
           </p:cNvPr>
@@ -4356,76 +5369,24 @@
         </p:nvSpPr>
         <p:spPr>
           <a:xfrm>
-            <a:off x="299510" y="2708064"/>
-            <a:ext cx="1734770" cy="1403171"/>
-          </a:xfrm>
-          <a:prstGeom prst="hexagon">
+            <a:off x="6377028" y="472017"/>
+            <a:ext cx="1082566" cy="388947"/>
+          </a:xfrm>
+          <a:prstGeom prst="can">
             <a:avLst/>
           </a:prstGeom>
         </p:spPr>
         <p:style>
           <a:lnRef idx="2">
-            <a:schemeClr val="accent6"/>
-          </a:lnRef>
-          <a:fillRef idx="1">
-            <a:schemeClr val="lt1"/>
-          </a:fillRef>
-          <a:effectRef idx="0">
-            <a:schemeClr val="accent6"/>
-          </a:effectRef>
-          <a:fontRef idx="minor">
-            <a:schemeClr val="dk1"/>
-          </a:fontRef>
-        </p:style>
-        <p:txBody>
-          <a:bodyPr rtlCol="0" anchor="ctr"/>
-          <a:lstStyle/>
-          <a:p>
-            <a:pPr algn="ctr"/>
-            <a:r>
-              <a:rPr lang="en-US" dirty="0"/>
-              <a:t>Generate the response</a:t>
-            </a:r>
-            <a:endParaRPr lang="en-US" dirty="0">
-              <a:solidFill>
-                <a:srgbClr val="FF0000"/>
-              </a:solidFill>
-            </a:endParaRPr>
-          </a:p>
-        </p:txBody>
-      </p:sp>
-      <p:sp>
-        <p:nvSpPr>
-          <p:cNvPr id="46" name="Right Arrow 45">
-            <a:extLst>
-              <a:ext uri="{FF2B5EF4-FFF2-40B4-BE49-F238E27FC236}">
-                <a16:creationId xmlns:a16="http://schemas.microsoft.com/office/drawing/2014/main" id="{D3EA469C-4D62-162F-3C89-AD40C1B2ED16}"/>
-              </a:ext>
-            </a:extLst>
-          </p:cNvPr>
-          <p:cNvSpPr/>
-          <p:nvPr/>
-        </p:nvSpPr>
-        <p:spPr>
-          <a:xfrm rot="13871326">
-            <a:off x="6244816" y="4576361"/>
-            <a:ext cx="1991412" cy="624524"/>
-          </a:xfrm>
-          <a:prstGeom prst="rightArrow">
-            <a:avLst/>
-          </a:prstGeom>
-        </p:spPr>
-        <p:style>
-          <a:lnRef idx="2">
-            <a:schemeClr val="accent4">
+            <a:schemeClr val="accent2">
               <a:shade val="15000"/>
             </a:schemeClr>
           </a:lnRef>
           <a:fillRef idx="1">
-            <a:schemeClr val="accent4"/>
+            <a:schemeClr val="accent2"/>
           </a:fillRef>
           <a:effectRef idx="0">
-            <a:schemeClr val="accent4"/>
+            <a:schemeClr val="accent2"/>
           </a:effectRef>
           <a:fontRef idx="minor">
             <a:schemeClr val="lt1"/>
@@ -4436,152 +5397,317 @@
           <a:lstStyle/>
           <a:p>
             <a:pPr algn="ctr"/>
-            <a:endParaRPr lang="en-US"/>
-          </a:p>
-        </p:txBody>
-      </p:sp>
-      <p:sp>
-        <p:nvSpPr>
-          <p:cNvPr id="47" name="Right Arrow 46">
-            <a:extLst>
-              <a:ext uri="{FF2B5EF4-FFF2-40B4-BE49-F238E27FC236}">
-                <a16:creationId xmlns:a16="http://schemas.microsoft.com/office/drawing/2014/main" id="{481F80E5-F2AE-8150-6503-89E161D76FF2}"/>
-              </a:ext>
-            </a:extLst>
-          </p:cNvPr>
-          <p:cNvSpPr/>
+            <a:r>
+              <a:rPr lang="en-US" sz="1600" dirty="0">
+                <a:latin typeface="Times New Roman" panose="02020603050405020304" pitchFamily="18" charset="0"/>
+                <a:cs typeface="Times New Roman" panose="02020603050405020304" pitchFamily="18" charset="0"/>
+              </a:rPr>
+              <a:t>DB</a:t>
+            </a:r>
+          </a:p>
+        </p:txBody>
+      </p:sp>
+      <p:cxnSp>
+        <p:nvCxnSpPr>
+          <p:cNvPr id="51" name="Elbow Connector 50">
+            <a:extLst>
+              <a:ext uri="{FF2B5EF4-FFF2-40B4-BE49-F238E27FC236}">
+                <a16:creationId xmlns:a16="http://schemas.microsoft.com/office/drawing/2014/main" id="{043ACDFA-922F-B2C9-3205-C78061F1804B}"/>
+              </a:ext>
+            </a:extLst>
+          </p:cNvPr>
+          <p:cNvCxnSpPr>
+            <a:cxnSpLocks/>
+            <a:stCxn id="13" idx="3"/>
+            <a:endCxn id="27" idx="1"/>
+          </p:cNvCxnSpPr>
           <p:nvPr/>
-        </p:nvSpPr>
-        <p:spPr>
-          <a:xfrm rot="9122614">
-            <a:off x="6195145" y="2530160"/>
-            <a:ext cx="1991412" cy="624524"/>
-          </a:xfrm>
-          <a:prstGeom prst="rightArrow">
+        </p:nvCxnSpPr>
+        <p:spPr>
+          <a:xfrm flipH="1">
+            <a:off x="5414441" y="758364"/>
+            <a:ext cx="6087943" cy="4719511"/>
+          </a:xfrm>
+          <a:prstGeom prst="bentConnector5">
+            <a:avLst>
+              <a:gd name="adj1" fmla="val -3755"/>
+              <a:gd name="adj2" fmla="val 126732"/>
+              <a:gd name="adj3" fmla="val 103755"/>
+            </a:avLst>
+          </a:prstGeom>
+          <a:ln>
+            <a:solidFill>
+              <a:srgbClr val="FF0000"/>
+            </a:solidFill>
+            <a:tailEnd type="triangle"/>
+          </a:ln>
+        </p:spPr>
+        <p:style>
+          <a:lnRef idx="2">
+            <a:schemeClr val="accent1"/>
+          </a:lnRef>
+          <a:fillRef idx="0">
+            <a:schemeClr val="accent1"/>
+          </a:fillRef>
+          <a:effectRef idx="1">
+            <a:schemeClr val="accent1"/>
+          </a:effectRef>
+          <a:fontRef idx="minor">
+            <a:schemeClr val="tx1"/>
+          </a:fontRef>
+        </p:style>
+      </p:cxnSp>
+      <p:sp>
+        <p:nvSpPr>
+          <p:cNvPr id="59" name="TextBox 58">
+            <a:extLst>
+              <a:ext uri="{FF2B5EF4-FFF2-40B4-BE49-F238E27FC236}">
+                <a16:creationId xmlns:a16="http://schemas.microsoft.com/office/drawing/2014/main" id="{293444CC-CF2A-E857-3F87-5F6154A50D7F}"/>
+              </a:ext>
+            </a:extLst>
+          </p:cNvPr>
+          <p:cNvSpPr txBox="1"/>
+          <p:nvPr/>
+        </p:nvSpPr>
+        <p:spPr>
+          <a:xfrm>
+            <a:off x="5346735" y="6074261"/>
+            <a:ext cx="2968206" cy="584775"/>
+          </a:xfrm>
+          <a:prstGeom prst="rect">
             <a:avLst/>
           </a:prstGeom>
-        </p:spPr>
-        <p:style>
-          <a:lnRef idx="2">
-            <a:schemeClr val="accent4">
-              <a:shade val="15000"/>
+          <a:solidFill>
+            <a:schemeClr val="accent6">
+              <a:lumMod val="20000"/>
+              <a:lumOff val="80000"/>
             </a:schemeClr>
-          </a:lnRef>
-          <a:fillRef idx="1">
-            <a:schemeClr val="accent4"/>
-          </a:fillRef>
-          <a:effectRef idx="0">
-            <a:schemeClr val="accent4"/>
-          </a:effectRef>
-          <a:fontRef idx="minor">
-            <a:schemeClr val="lt1"/>
-          </a:fontRef>
-        </p:style>
-        <p:txBody>
-          <a:bodyPr rtlCol="0" anchor="ctr"/>
-          <a:lstStyle/>
-          <a:p>
-            <a:pPr algn="ctr"/>
-            <a:endParaRPr lang="en-US"/>
-          </a:p>
-        </p:txBody>
-      </p:sp>
-      <p:sp>
-        <p:nvSpPr>
-          <p:cNvPr id="48" name="Right Arrow 47">
-            <a:extLst>
-              <a:ext uri="{FF2B5EF4-FFF2-40B4-BE49-F238E27FC236}">
-                <a16:creationId xmlns:a16="http://schemas.microsoft.com/office/drawing/2014/main" id="{5D932EAC-D0DA-9953-90CB-1D2A39EB538A}"/>
-              </a:ext>
-            </a:extLst>
-          </p:cNvPr>
-          <p:cNvSpPr/>
-          <p:nvPr/>
-        </p:nvSpPr>
-        <p:spPr>
-          <a:xfrm rot="10800000">
-            <a:off x="2100240" y="3114536"/>
-            <a:ext cx="1991412" cy="624524"/>
-          </a:xfrm>
-          <a:prstGeom prst="rightArrow">
-            <a:avLst/>
-          </a:prstGeom>
-        </p:spPr>
-        <p:style>
-          <a:lnRef idx="2">
-            <a:schemeClr val="accent4">
-              <a:shade val="15000"/>
-            </a:schemeClr>
-          </a:lnRef>
-          <a:fillRef idx="1">
-            <a:schemeClr val="accent4"/>
-          </a:fillRef>
-          <a:effectRef idx="0">
-            <a:schemeClr val="accent4"/>
-          </a:effectRef>
-          <a:fontRef idx="minor">
-            <a:schemeClr val="lt1"/>
-          </a:fontRef>
-        </p:style>
-        <p:txBody>
-          <a:bodyPr rtlCol="0" anchor="ctr"/>
-          <a:lstStyle/>
-          <a:p>
-            <a:pPr algn="ctr"/>
-            <a:endParaRPr lang="en-US"/>
-          </a:p>
-        </p:txBody>
-      </p:sp>
-      <p:sp>
-        <p:nvSpPr>
-          <p:cNvPr id="49" name="Right Arrow 48">
-            <a:extLst>
-              <a:ext uri="{FF2B5EF4-FFF2-40B4-BE49-F238E27FC236}">
-                <a16:creationId xmlns:a16="http://schemas.microsoft.com/office/drawing/2014/main" id="{508B15A5-B526-EDF6-FF5E-7BE93933AA7D}"/>
-              </a:ext>
-            </a:extLst>
-          </p:cNvPr>
-          <p:cNvSpPr/>
-          <p:nvPr/>
-        </p:nvSpPr>
-        <p:spPr>
-          <a:xfrm rot="16200000">
-            <a:off x="490717" y="4676481"/>
-            <a:ext cx="1403170" cy="424283"/>
-          </a:xfrm>
-          <a:prstGeom prst="rightArrow">
-            <a:avLst/>
-          </a:prstGeom>
-        </p:spPr>
-        <p:style>
-          <a:lnRef idx="2">
-            <a:schemeClr val="accent4">
-              <a:shade val="15000"/>
-            </a:schemeClr>
-          </a:lnRef>
-          <a:fillRef idx="1">
-            <a:schemeClr val="accent4"/>
-          </a:fillRef>
-          <a:effectRef idx="0">
-            <a:schemeClr val="accent4"/>
-          </a:effectRef>
-          <a:fontRef idx="minor">
-            <a:schemeClr val="lt1"/>
-          </a:fontRef>
-        </p:style>
-        <p:txBody>
-          <a:bodyPr rtlCol="0" anchor="ctr"/>
-          <a:lstStyle/>
-          <a:p>
-            <a:pPr algn="ctr"/>
-            <a:endParaRPr lang="en-US"/>
+          </a:solidFill>
+        </p:spPr>
+        <p:txBody>
+          <a:bodyPr wrap="square" rtlCol="0">
+            <a:spAutoFit/>
+          </a:bodyPr>
+          <a:lstStyle/>
+          <a:p>
+            <a:r>
+              <a:rPr lang="en-US" sz="1600" dirty="0">
+                <a:latin typeface="Times New Roman" panose="02020603050405020304" pitchFamily="18" charset="0"/>
+                <a:cs typeface="Times New Roman" panose="02020603050405020304" pitchFamily="18" charset="0"/>
+              </a:rPr>
+              <a:t>Find the most similar K questions as the predicted K sentence </a:t>
+            </a:r>
           </a:p>
         </p:txBody>
       </p:sp>
     </p:spTree>
     <p:extLst>
       <p:ext uri="{BB962C8B-B14F-4D97-AF65-F5344CB8AC3E}">
-        <p14:creationId xmlns:p14="http://schemas.microsoft.com/office/powerpoint/2010/main" val="142442435"/>
+        <p14:creationId xmlns:p14="http://schemas.microsoft.com/office/powerpoint/2010/main" val="300283768"/>
+      </p:ext>
+    </p:extLst>
+  </p:cSld>
+  <p:clrMapOvr>
+    <a:masterClrMapping/>
+  </p:clrMapOvr>
+</p:sld>
+</file>
+
+<file path=ppt/slides/slide3.xml><?xml version="1.0" encoding="utf-8"?>
+<p:sld xmlns:a="http://schemas.openxmlformats.org/drawingml/2006/main" xmlns:r="http://schemas.openxmlformats.org/officeDocument/2006/relationships" xmlns:p="http://schemas.openxmlformats.org/presentationml/2006/main">
+  <p:cSld>
+    <p:spTree>
+      <p:nvGrpSpPr>
+        <p:cNvPr id="1" name=""/>
+        <p:cNvGrpSpPr/>
+        <p:nvPr/>
+      </p:nvGrpSpPr>
+      <p:grpSpPr>
+        <a:xfrm>
+          <a:off x="0" y="0"/>
+          <a:ext cx="0" cy="0"/>
+          <a:chOff x="0" y="0"/>
+          <a:chExt cx="0" cy="0"/>
+        </a:xfrm>
+      </p:grpSpPr>
+      <p:pic>
+        <p:nvPicPr>
+          <p:cNvPr id="1026" name="Picture 2">
+            <a:extLst>
+              <a:ext uri="{FF2B5EF4-FFF2-40B4-BE49-F238E27FC236}">
+                <a16:creationId xmlns:a16="http://schemas.microsoft.com/office/drawing/2014/main" id="{B09870E9-7090-C916-B5D3-F81B3FEEBB72}"/>
+              </a:ext>
+            </a:extLst>
+          </p:cNvPr>
+          <p:cNvPicPr>
+            <a:picLocks noChangeAspect="1" noChangeArrowheads="1"/>
+          </p:cNvPicPr>
+          <p:nvPr/>
+        </p:nvPicPr>
+        <p:blipFill>
+          <a:blip r:embed="rId2">
+            <a:extLst>
+              <a:ext uri="{28A0092B-C50C-407E-A947-70E740481C1C}">
+                <a14:useLocalDpi xmlns:a14="http://schemas.microsoft.com/office/drawing/2010/main" val="0"/>
+              </a:ext>
+            </a:extLst>
+          </a:blip>
+          <a:srcRect/>
+          <a:stretch>
+            <a:fillRect/>
+          </a:stretch>
+        </p:blipFill>
+        <p:spPr bwMode="auto">
+          <a:xfrm>
+            <a:off x="815918" y="27126"/>
+            <a:ext cx="10945157" cy="6803747"/>
+          </a:xfrm>
+          <a:prstGeom prst="rect">
+            <a:avLst/>
+          </a:prstGeom>
+          <a:noFill/>
+          <a:extLst>
+            <a:ext uri="{909E8E84-426E-40DD-AFC4-6F175D3DCCD1}">
+              <a14:hiddenFill xmlns:a14="http://schemas.microsoft.com/office/drawing/2010/main">
+                <a:solidFill>
+                  <a:srgbClr val="FFFFFF"/>
+                </a:solidFill>
+              </a14:hiddenFill>
+            </a:ext>
+          </a:extLst>
+        </p:spPr>
+      </p:pic>
+    </p:spTree>
+    <p:extLst>
+      <p:ext uri="{BB962C8B-B14F-4D97-AF65-F5344CB8AC3E}">
+        <p14:creationId xmlns:p14="http://schemas.microsoft.com/office/powerpoint/2010/main" val="2460531810"/>
+      </p:ext>
+    </p:extLst>
+  </p:cSld>
+  <p:clrMapOvr>
+    <a:masterClrMapping/>
+  </p:clrMapOvr>
+</p:sld>
+</file>
+
+<file path=ppt/slides/slide4.xml><?xml version="1.0" encoding="utf-8"?>
+<p:sld xmlns:a="http://schemas.openxmlformats.org/drawingml/2006/main" xmlns:r="http://schemas.openxmlformats.org/officeDocument/2006/relationships" xmlns:p="http://schemas.openxmlformats.org/presentationml/2006/main">
+  <p:cSld>
+    <p:spTree>
+      <p:nvGrpSpPr>
+        <p:cNvPr id="1" name=""/>
+        <p:cNvGrpSpPr/>
+        <p:nvPr/>
+      </p:nvGrpSpPr>
+      <p:grpSpPr>
+        <a:xfrm>
+          <a:off x="0" y="0"/>
+          <a:ext cx="0" cy="0"/>
+          <a:chOff x="0" y="0"/>
+          <a:chExt cx="0" cy="0"/>
+        </a:xfrm>
+      </p:grpSpPr>
+      <p:sp>
+        <p:nvSpPr>
+          <p:cNvPr id="2" name="Title 1">
+            <a:extLst>
+              <a:ext uri="{FF2B5EF4-FFF2-40B4-BE49-F238E27FC236}">
+                <a16:creationId xmlns:a16="http://schemas.microsoft.com/office/drawing/2014/main" id="{9E77AE5B-715F-B236-7FE4-A0766119889E}"/>
+              </a:ext>
+            </a:extLst>
+          </p:cNvPr>
+          <p:cNvSpPr>
+            <a:spLocks noGrp="1"/>
+          </p:cNvSpPr>
+          <p:nvPr>
+            <p:ph type="title"/>
+          </p:nvPr>
+        </p:nvSpPr>
+        <p:spPr/>
+        <p:txBody>
+          <a:bodyPr/>
+          <a:lstStyle/>
+          <a:p>
+            <a:endParaRPr lang="en-US"/>
+          </a:p>
+        </p:txBody>
+      </p:sp>
+      <p:sp>
+        <p:nvSpPr>
+          <p:cNvPr id="3" name="Content Placeholder 2">
+            <a:extLst>
+              <a:ext uri="{FF2B5EF4-FFF2-40B4-BE49-F238E27FC236}">
+                <a16:creationId xmlns:a16="http://schemas.microsoft.com/office/drawing/2014/main" id="{27A4F55B-1A29-8620-629A-DB9AB0EC70AE}"/>
+              </a:ext>
+            </a:extLst>
+          </p:cNvPr>
+          <p:cNvSpPr>
+            <a:spLocks noGrp="1"/>
+          </p:cNvSpPr>
+          <p:nvPr>
+            <p:ph idx="1"/>
+          </p:nvPr>
+        </p:nvSpPr>
+        <p:spPr/>
+        <p:txBody>
+          <a:bodyPr/>
+          <a:lstStyle/>
+          <a:p>
+            <a:endParaRPr lang="en-US"/>
+          </a:p>
+        </p:txBody>
+      </p:sp>
+      <p:pic>
+        <p:nvPicPr>
+          <p:cNvPr id="2050" name="Picture 2">
+            <a:extLst>
+              <a:ext uri="{FF2B5EF4-FFF2-40B4-BE49-F238E27FC236}">
+                <a16:creationId xmlns:a16="http://schemas.microsoft.com/office/drawing/2014/main" id="{D76A2494-79C4-095B-2ADA-A743BD7EDFCE}"/>
+              </a:ext>
+            </a:extLst>
+          </p:cNvPr>
+          <p:cNvPicPr>
+            <a:picLocks noChangeAspect="1" noChangeArrowheads="1"/>
+          </p:cNvPicPr>
+          <p:nvPr/>
+        </p:nvPicPr>
+        <p:blipFill>
+          <a:blip r:embed="rId2">
+            <a:extLst>
+              <a:ext uri="{28A0092B-C50C-407E-A947-70E740481C1C}">
+                <a14:useLocalDpi xmlns:a14="http://schemas.microsoft.com/office/drawing/2010/main" val="0"/>
+              </a:ext>
+            </a:extLst>
+          </a:blip>
+          <a:srcRect/>
+          <a:stretch>
+            <a:fillRect/>
+          </a:stretch>
+        </p:blipFill>
+        <p:spPr bwMode="auto">
+          <a:xfrm>
+            <a:off x="688241" y="0"/>
+            <a:ext cx="11025724" cy="6858000"/>
+          </a:xfrm>
+          <a:prstGeom prst="rect">
+            <a:avLst/>
+          </a:prstGeom>
+          <a:noFill/>
+          <a:extLst>
+            <a:ext uri="{909E8E84-426E-40DD-AFC4-6F175D3DCCD1}">
+              <a14:hiddenFill xmlns:a14="http://schemas.microsoft.com/office/drawing/2010/main">
+                <a:solidFill>
+                  <a:srgbClr val="FFFFFF"/>
+                </a:solidFill>
+              </a14:hiddenFill>
+            </a:ext>
+          </a:extLst>
+        </p:spPr>
+      </p:pic>
+    </p:spTree>
+    <p:extLst>
+      <p:ext uri="{BB962C8B-B14F-4D97-AF65-F5344CB8AC3E}">
+        <p14:creationId xmlns:p14="http://schemas.microsoft.com/office/powerpoint/2010/main" val="2618055173"/>
       </p:ext>
     </p:extLst>
   </p:cSld>

</xml_diff>